<commit_message>
updated presentations given Charles comments
</commit_message>
<xml_diff>
--- a/Presentations/IHE-and-HL7.pptx
+++ b/Presentations/IHE-and-HL7.pptx
@@ -14956,14 +14956,22 @@
             <a:spLocks noGrp="1"/>
           </p:cNvSpPr>
           <p:nvPr>
-            <p:ph idx="1"/>
+            <p:ph sz="half" idx="1"/>
           </p:nvPr>
         </p:nvSpPr>
-        <p:spPr/>
-        <p:txBody>
-          <a:bodyPr/>
+        <p:spPr>
+          <a:xfrm>
+            <a:off x="691514" y="2069042"/>
+            <a:ext cx="8376286" cy="4931516"/>
+          </a:xfrm>
+        </p:spPr>
+        <p:txBody>
+          <a:bodyPr>
+            <a:normAutofit fontScale="92500" lnSpcReduction="10000"/>
+          </a:bodyPr>
           <a:lstStyle/>
           <a:p>
+            <a:pPr algn="ctr"/>
             <a:r>
               <a:rPr lang="en-US" dirty="0"/>
               <a:t>Join IHE by visiting: </a:t>
@@ -14977,132 +14985,321 @@
             <a:endParaRPr lang="en-US" dirty="0"/>
           </a:p>
           <a:p>
+            <a:pPr algn="ctr"/>
+            <a:r>
+              <a:rPr lang="en-US" dirty="0"/>
+              <a:t>IHE Deployment Committees Worldwide</a:t>
+            </a:r>
+          </a:p>
+          <a:p>
+            <a:r>
+              <a:rPr lang="en-US" dirty="0">
+                <a:hlinkClick r:id="rId3"/>
+              </a:rPr>
+              <a:t>North America</a:t>
+            </a:r>
             <a:endParaRPr lang="en-US" dirty="0"/>
           </a:p>
-        </p:txBody>
-      </p:sp>
-      <p:pic>
-        <p:nvPicPr>
-          <p:cNvPr id="4" name="Picture 2"/>
-          <p:cNvPicPr>
-            <a:picLocks noChangeAspect="1" noChangeArrowheads="1"/>
-          </p:cNvPicPr>
-          <p:nvPr/>
-        </p:nvPicPr>
-        <p:blipFill rotWithShape="1">
-          <a:blip r:embed="rId3" cstate="screen">
+          <a:p>
+            <a:pPr lvl="1"/>
+            <a:r>
+              <a:rPr lang="en-US" dirty="0">
+                <a:hlinkClick r:id="rId4"/>
+              </a:rPr>
+              <a:t>Canada </a:t>
+            </a:r>
+            <a:endParaRPr lang="en-US" dirty="0"/>
+          </a:p>
+          <a:p>
+            <a:pPr lvl="1"/>
+            <a:r>
+              <a:rPr lang="en-US" dirty="0">
+                <a:hlinkClick r:id="rId5"/>
+              </a:rPr>
+              <a:t>USA</a:t>
+            </a:r>
+            <a:endParaRPr lang="en-US" dirty="0"/>
+          </a:p>
+          <a:p>
+            <a:r>
+              <a:rPr lang="en-US" dirty="0">
+                <a:hlinkClick r:id="rId6"/>
+              </a:rPr>
+              <a:t>South America</a:t>
+            </a:r>
+            <a:endParaRPr lang="en-US" dirty="0"/>
+          </a:p>
+          <a:p>
+            <a:pPr lvl="1"/>
+            <a:r>
+              <a:rPr lang="en-US" dirty="0">
+                <a:hlinkClick r:id="rId7"/>
+              </a:rPr>
+              <a:t>Brazil</a:t>
+            </a:r>
+            <a:endParaRPr lang="en-US" dirty="0"/>
+          </a:p>
+          <a:p>
+            <a:r>
+              <a:rPr lang="en-US" dirty="0">
+                <a:hlinkClick r:id="rId8"/>
+              </a:rPr>
+              <a:t>Asia Pacific</a:t>
+            </a:r>
+            <a:endParaRPr lang="en-US" dirty="0"/>
+          </a:p>
+          <a:p>
+            <a:pPr lvl="1"/>
+            <a:r>
+              <a:rPr lang="en-US" dirty="0">
+                <a:hlinkClick r:id="rId9"/>
+              </a:rPr>
+              <a:t>Australia</a:t>
+            </a:r>
+            <a:endParaRPr lang="en-US" dirty="0"/>
+          </a:p>
+          <a:p>
+            <a:pPr lvl="1"/>
+            <a:r>
+              <a:rPr lang="en-US" dirty="0">
+                <a:hlinkClick r:id="rId10"/>
+              </a:rPr>
+              <a:t>China</a:t>
+            </a:r>
+            <a:endParaRPr lang="en-US" dirty="0"/>
+          </a:p>
+          <a:p>
+            <a:pPr lvl="1"/>
+            <a:r>
+              <a:rPr lang="en-US" dirty="0">
+                <a:hlinkClick r:id="rId11"/>
+              </a:rPr>
+              <a:t>Japan</a:t>
+            </a:r>
+            <a:endParaRPr lang="en-US" dirty="0"/>
+          </a:p>
+          <a:p>
+            <a:pPr lvl="1"/>
+            <a:r>
+              <a:rPr lang="en-US" dirty="0">
+                <a:hlinkClick r:id="rId12"/>
+              </a:rPr>
+              <a:t>Korea</a:t>
+            </a:r>
+            <a:endParaRPr lang="en-US" dirty="0"/>
+          </a:p>
+          <a:p>
+            <a:pPr lvl="1"/>
+            <a:r>
+              <a:rPr lang="en-US" dirty="0">
+                <a:hlinkClick r:id="rId13"/>
+              </a:rPr>
+              <a:t>Taiwan</a:t>
+            </a:r>
+            <a:endParaRPr lang="en-US" dirty="0"/>
+          </a:p>
+          <a:p>
+            <a:r>
+              <a:rPr lang="en-US" dirty="0">
+                <a:hlinkClick r:id="rId14"/>
+              </a:rPr>
+              <a:t>Middle East</a:t>
+            </a:r>
+            <a:endParaRPr lang="en-US" dirty="0"/>
+          </a:p>
+          <a:p>
+            <a:pPr lvl="1"/>
+            <a:r>
+              <a:rPr lang="en-US" dirty="0">
+                <a:hlinkClick r:id="rId15"/>
+              </a:rPr>
+              <a:t>Saudi Arabia</a:t>
+            </a:r>
+            <a:endParaRPr lang="en-US" dirty="0"/>
+          </a:p>
+        </p:txBody>
+      </p:sp>
+      <p:sp>
+        <p:nvSpPr>
+          <p:cNvPr id="5" name="Content Placeholder 4">
             <a:extLst>
-              <a:ext uri="{28A0092B-C50C-407E-A947-70E740481C1C}">
-                <a14:useLocalDpi xmlns:a14="http://schemas.microsoft.com/office/drawing/2010/main"/>
+              <a:ext uri="{FF2B5EF4-FFF2-40B4-BE49-F238E27FC236}">
+                <a16:creationId xmlns:a16="http://schemas.microsoft.com/office/drawing/2014/main" id="{CB3E4A84-C6EC-40EC-A4E0-45DCF5FF8536}"/>
               </a:ext>
             </a:extLst>
-          </a:blip>
-          <a:srcRect/>
-          <a:stretch/>
-        </p:blipFill>
-        <p:spPr bwMode="auto">
-          <a:xfrm>
-            <a:off x="3014076" y="2804658"/>
-            <a:ext cx="4668661" cy="2670546"/>
-          </a:xfrm>
-          <a:prstGeom prst="rect">
-            <a:avLst/>
-          </a:prstGeom>
-          <a:noFill/>
-          <a:ln>
-            <a:noFill/>
-          </a:ln>
-          <a:effectLst/>
-          <a:extLst>
-            <a:ext uri="{909E8E84-426E-40DD-AFC4-6F175D3DCCD1}">
-              <a14:hiddenFill xmlns:a14="http://schemas.microsoft.com/office/drawing/2010/main">
-                <a:solidFill>
-                  <a:schemeClr val="accent1"/>
-                </a:solidFill>
-              </a14:hiddenFill>
-            </a:ext>
-            <a:ext uri="{91240B29-F687-4F45-9708-019B960494DF}">
-              <a14:hiddenLine xmlns:a14="http://schemas.microsoft.com/office/drawing/2010/main" w="9525">
-                <a:solidFill>
-                  <a:schemeClr val="tx1"/>
-                </a:solidFill>
-                <a:miter lim="800000"/>
-                <a:headEnd/>
-                <a:tailEnd/>
-              </a14:hiddenLine>
-            </a:ext>
-            <a:ext uri="{AF507438-7753-43E0-B8FC-AC1667EBCBE1}">
-              <a14:hiddenEffects xmlns:a14="http://schemas.microsoft.com/office/drawing/2010/main">
-                <a:effectLst>
-                  <a:outerShdw dist="35921" dir="2700000" algn="ctr" rotWithShape="0">
-                    <a:schemeClr val="bg2"/>
-                  </a:outerShdw>
-                </a:effectLst>
-              </a14:hiddenEffects>
-            </a:ext>
-          </a:extLst>
-        </p:spPr>
-      </p:pic>
-      <p:pic>
-        <p:nvPicPr>
-          <p:cNvPr id="7" name="Picture 6"/>
-          <p:cNvPicPr>
-            <a:picLocks noChangeAspect="1"/>
-          </p:cNvPicPr>
-          <p:nvPr/>
-        </p:nvPicPr>
-        <p:blipFill>
-          <a:blip r:embed="rId4">
-            <a:extLst>
-              <a:ext uri="{28A0092B-C50C-407E-A947-70E740481C1C}">
-                <a14:useLocalDpi xmlns:a14="http://schemas.microsoft.com/office/drawing/2010/main"/>
-              </a:ext>
-            </a:extLst>
-          </a:blip>
-          <a:stretch>
-            <a:fillRect/>
-          </a:stretch>
-        </p:blipFill>
+          </p:cNvPr>
+          <p:cNvSpPr>
+            <a:spLocks noGrp="1"/>
+          </p:cNvSpPr>
+          <p:nvPr>
+            <p:ph sz="half" idx="2"/>
+          </p:nvPr>
+        </p:nvSpPr>
         <p:spPr>
           <a:xfrm>
-            <a:off x="3014076" y="5639307"/>
-            <a:ext cx="6490474" cy="1066293"/>
+            <a:off x="5092065" y="2817470"/>
+            <a:ext cx="4274820" cy="4333558"/>
           </a:xfrm>
-          <a:prstGeom prst="rect">
-            <a:avLst/>
-          </a:prstGeom>
         </p:spPr>
-      </p:pic>
-      <p:pic>
-        <p:nvPicPr>
-          <p:cNvPr id="2" name="Picture 1"/>
-          <p:cNvPicPr>
-            <a:picLocks noChangeAspect="1"/>
-          </p:cNvPicPr>
-          <p:nvPr/>
-        </p:nvPicPr>
-        <p:blipFill>
-          <a:blip r:embed="rId5" cstate="screen">
-            <a:extLst>
-              <a:ext uri="{28A0092B-C50C-407E-A947-70E740481C1C}">
-                <a14:useLocalDpi xmlns:a14="http://schemas.microsoft.com/office/drawing/2010/main"/>
-              </a:ext>
-            </a:extLst>
-          </a:blip>
-          <a:stretch>
-            <a:fillRect/>
-          </a:stretch>
-        </p:blipFill>
-        <p:spPr>
-          <a:xfrm>
-            <a:off x="1177435" y="2812781"/>
-            <a:ext cx="1682922" cy="3892819"/>
-          </a:xfrm>
-          <a:prstGeom prst="rect">
-            <a:avLst/>
-          </a:prstGeom>
-        </p:spPr>
-      </p:pic>
+        <p:txBody>
+          <a:bodyPr>
+            <a:normAutofit fontScale="92500" lnSpcReduction="10000"/>
+          </a:bodyPr>
+          <a:lstStyle/>
+          <a:p>
+            <a:r>
+              <a:rPr lang="en-US" u="sng" dirty="0">
+                <a:hlinkClick r:id="rId16"/>
+              </a:rPr>
+              <a:t>Europe</a:t>
+            </a:r>
+            <a:endParaRPr lang="en-US" dirty="0"/>
+          </a:p>
+          <a:p>
+            <a:pPr lvl="1"/>
+            <a:r>
+              <a:rPr lang="en-US" dirty="0">
+                <a:hlinkClick r:id="rId17"/>
+              </a:rPr>
+              <a:t>Austria</a:t>
+            </a:r>
+            <a:endParaRPr lang="en-US" dirty="0"/>
+          </a:p>
+          <a:p>
+            <a:pPr lvl="1"/>
+            <a:r>
+              <a:rPr lang="en-US" dirty="0">
+                <a:hlinkClick r:id="rId18"/>
+              </a:rPr>
+              <a:t>Belgium</a:t>
+            </a:r>
+            <a:endParaRPr lang="en-US" dirty="0"/>
+          </a:p>
+          <a:p>
+            <a:pPr lvl="1"/>
+            <a:r>
+              <a:rPr lang="en-US" dirty="0"/>
+              <a:t>Czech Republic</a:t>
+            </a:r>
+          </a:p>
+          <a:p>
+            <a:pPr lvl="1"/>
+            <a:r>
+              <a:rPr lang="en-US" dirty="0">
+                <a:hlinkClick r:id="rId19"/>
+              </a:rPr>
+              <a:t>Europe</a:t>
+            </a:r>
+            <a:endParaRPr lang="en-US" dirty="0"/>
+          </a:p>
+          <a:p>
+            <a:pPr lvl="1"/>
+            <a:r>
+              <a:rPr lang="en-US" dirty="0">
+                <a:hlinkClick r:id="rId20"/>
+              </a:rPr>
+              <a:t>Finland</a:t>
+            </a:r>
+            <a:endParaRPr lang="en-US" dirty="0"/>
+          </a:p>
+          <a:p>
+            <a:pPr lvl="1"/>
+            <a:r>
+              <a:rPr lang="en-US" dirty="0">
+                <a:hlinkClick r:id="rId21"/>
+              </a:rPr>
+              <a:t>France</a:t>
+            </a:r>
+            <a:endParaRPr lang="en-US" dirty="0"/>
+          </a:p>
+          <a:p>
+            <a:pPr lvl="1"/>
+            <a:r>
+              <a:rPr lang="en-US" dirty="0">
+                <a:hlinkClick r:id="rId22"/>
+              </a:rPr>
+              <a:t>Germany</a:t>
+            </a:r>
+            <a:endParaRPr lang="en-US" dirty="0"/>
+          </a:p>
+          <a:p>
+            <a:pPr lvl="1"/>
+            <a:r>
+              <a:rPr lang="en-US" dirty="0">
+                <a:hlinkClick r:id="rId23"/>
+              </a:rPr>
+              <a:t>Italy</a:t>
+            </a:r>
+            <a:endParaRPr lang="en-US" dirty="0"/>
+          </a:p>
+          <a:p>
+            <a:pPr lvl="1"/>
+            <a:r>
+              <a:rPr lang="en-US" dirty="0">
+                <a:hlinkClick r:id="rId24"/>
+              </a:rPr>
+              <a:t>Luxembourg</a:t>
+            </a:r>
+            <a:endParaRPr lang="en-US" dirty="0"/>
+          </a:p>
+          <a:p>
+            <a:pPr lvl="1"/>
+            <a:r>
+              <a:rPr lang="en-US" dirty="0">
+                <a:hlinkClick r:id="rId25"/>
+              </a:rPr>
+              <a:t>Netherlands</a:t>
+            </a:r>
+            <a:endParaRPr lang="en-US" dirty="0"/>
+          </a:p>
+          <a:p>
+            <a:pPr lvl="1"/>
+            <a:r>
+              <a:rPr lang="en-US" dirty="0">
+                <a:hlinkClick r:id="rId26"/>
+              </a:rPr>
+              <a:t>Spain</a:t>
+            </a:r>
+            <a:endParaRPr lang="en-US" dirty="0"/>
+          </a:p>
+          <a:p>
+            <a:pPr lvl="1"/>
+            <a:r>
+              <a:rPr lang="en-US" dirty="0">
+                <a:hlinkClick r:id="rId27"/>
+              </a:rPr>
+              <a:t>Switzerland</a:t>
+            </a:r>
+            <a:endParaRPr lang="en-US" dirty="0"/>
+          </a:p>
+          <a:p>
+            <a:pPr lvl="1"/>
+            <a:r>
+              <a:rPr lang="en-US" dirty="0">
+                <a:hlinkClick r:id="rId28"/>
+              </a:rPr>
+              <a:t>Turkey</a:t>
+            </a:r>
+            <a:endParaRPr lang="en-US" dirty="0"/>
+          </a:p>
+          <a:p>
+            <a:pPr lvl="1"/>
+            <a:r>
+              <a:rPr lang="en-US" dirty="0">
+                <a:hlinkClick r:id="rId29"/>
+              </a:rPr>
+              <a:t>UK</a:t>
+            </a:r>
+            <a:endParaRPr lang="en-US" dirty="0"/>
+          </a:p>
+          <a:p>
+            <a:endParaRPr lang="en-US" dirty="0"/>
+          </a:p>
+          <a:p>
+            <a:endParaRPr lang="en-US" dirty="0"/>
+          </a:p>
+        </p:txBody>
+      </p:sp>
     </p:spTree>
     <p:extLst>
       <p:ext uri="{BB962C8B-B14F-4D97-AF65-F5344CB8AC3E}">
@@ -15133,6 +15330,53 @@
           <a:chExt cx="0" cy="0"/>
         </a:xfrm>
       </p:grpSpPr>
+      <p:pic>
+        <p:nvPicPr>
+          <p:cNvPr id="1026" name="Picture 2">
+            <a:extLst>
+              <a:ext uri="{FF2B5EF4-FFF2-40B4-BE49-F238E27FC236}">
+                <a16:creationId xmlns:a16="http://schemas.microsoft.com/office/drawing/2014/main" id="{784C3488-82E8-4639-955E-FE4927C1F1BA}"/>
+              </a:ext>
+            </a:extLst>
+          </p:cNvPr>
+          <p:cNvPicPr>
+            <a:picLocks noChangeAspect="1" noChangeArrowheads="1"/>
+          </p:cNvPicPr>
+          <p:nvPr/>
+        </p:nvPicPr>
+        <p:blipFill>
+          <a:blip r:embed="rId3">
+            <a:extLst>
+              <a:ext uri="{28A0092B-C50C-407E-A947-70E740481C1C}">
+                <a14:useLocalDpi xmlns:a14="http://schemas.microsoft.com/office/drawing/2010/main" val="0"/>
+              </a:ext>
+            </a:extLst>
+          </a:blip>
+          <a:srcRect/>
+          <a:stretch>
+            <a:fillRect/>
+          </a:stretch>
+        </p:blipFill>
+        <p:spPr bwMode="auto">
+          <a:xfrm>
+            <a:off x="277761" y="176851"/>
+            <a:ext cx="9753600" cy="3305175"/>
+          </a:xfrm>
+          <a:prstGeom prst="rect">
+            <a:avLst/>
+          </a:prstGeom>
+          <a:noFill/>
+          <a:extLst>
+            <a:ext uri="{909E8E84-426E-40DD-AFC4-6F175D3DCCD1}">
+              <a14:hiddenFill xmlns:a14="http://schemas.microsoft.com/office/drawing/2010/main">
+                <a:solidFill>
+                  <a:srgbClr val="FFFFFF"/>
+                </a:solidFill>
+              </a14:hiddenFill>
+            </a:ext>
+          </a:extLst>
+        </p:spPr>
+      </p:pic>
       <p:sp>
         <p:nvSpPr>
           <p:cNvPr id="2" name="Title 1">
@@ -15149,18 +15393,23 @@
             <p:ph type="ctrTitle"/>
           </p:nvPr>
         </p:nvSpPr>
-        <p:spPr/>
+        <p:spPr>
+          <a:xfrm>
+            <a:off x="1257300" y="2636997"/>
+            <a:ext cx="7543800" cy="2705947"/>
+          </a:xfrm>
+        </p:spPr>
         <p:txBody>
           <a:bodyPr/>
           <a:lstStyle/>
           <a:p>
             <a:pPr defTabSz="1018818"/>
             <a:r>
-              <a:rPr lang="en-US" sz="5400"/>
+              <a:rPr lang="en-US" sz="5400" dirty="0"/>
               <a:t>Questions?</a:t>
             </a:r>
             <a:br>
-              <a:rPr lang="en-US" sz="5400"/>
+              <a:rPr lang="en-US" sz="5400" dirty="0"/>
             </a:br>
             <a:endParaRPr lang="en-US" sz="5400" dirty="0"/>
           </a:p>
@@ -15182,7 +15431,12 @@
             <p:ph type="subTitle" idx="1"/>
           </p:nvPr>
         </p:nvSpPr>
-        <p:spPr/>
+        <p:spPr>
+          <a:xfrm>
+            <a:off x="1382661" y="5283580"/>
+            <a:ext cx="7543800" cy="1876530"/>
+          </a:xfrm>
+        </p:spPr>
         <p:txBody>
           <a:bodyPr/>
           <a:lstStyle/>

</xml_diff>

<commit_message>
minor fixup in ihe and hl7 powerpoint slides
</commit_message>
<xml_diff>
--- a/Presentations/IHE-and-HL7.pptx
+++ b/Presentations/IHE-and-HL7.pptx
@@ -11321,7 +11321,7 @@
         <p:spPr>
           <a:xfrm>
             <a:off x="360703" y="1613004"/>
-            <a:ext cx="8686800" cy="1785104"/>
+            <a:ext cx="8686800" cy="2800767"/>
           </a:xfrm>
           <a:prstGeom prst="rect">
             <a:avLst/>
@@ -11336,7 +11336,7 @@
           <a:p>
             <a:pPr algn="ctr"/>
             <a:r>
-              <a:rPr lang="en-US" sz="2800" dirty="0"/>
+              <a:rPr lang="en-US" sz="3600" b="1" dirty="0"/>
               <a:t>IHE and HL7 working together</a:t>
             </a:r>
           </a:p>
@@ -11350,23 +11350,33 @@
           <a:p>
             <a:pPr algn="ctr"/>
             <a:r>
-              <a:rPr lang="en-US" dirty="0"/>
+              <a:rPr lang="en-US" sz="2800" dirty="0"/>
               <a:t>&lt;JohnMoehrke@gmail.com&gt;</a:t>
             </a:r>
           </a:p>
           <a:p>
             <a:pPr algn="ctr"/>
             <a:r>
-              <a:rPr lang="en-US" dirty="0"/>
+              <a:rPr lang="en-US" sz="2800" dirty="0"/>
               <a:t>&lt;John.Moehrke@byLight.com&gt;</a:t>
             </a:r>
           </a:p>
           <a:p>
             <a:pPr algn="ctr"/>
             <a:r>
-              <a:rPr lang="en-US" dirty="0"/>
+              <a:rPr lang="en-US" sz="2800" dirty="0"/>
               <a:t>Co-Chair: IHE ITI Planning and Technical Committees</a:t>
             </a:r>
+          </a:p>
+          <a:p>
+            <a:pPr algn="ctr"/>
+            <a:r>
+              <a:rPr lang="en-US" sz="2800" dirty="0">
+                <a:hlinkClick r:id="rId3"/>
+              </a:rPr>
+              <a:t>https://HealthcareSecPrivacy.blogspot.com/</a:t>
+            </a:r>
+            <a:endParaRPr lang="en-US" sz="2800" dirty="0"/>
           </a:p>
         </p:txBody>
       </p:sp>
@@ -11459,7 +11469,7 @@
             <p:nvPr/>
           </p:nvPicPr>
           <p:blipFill>
-            <a:blip r:embed="rId3" cstate="screen">
+            <a:blip r:embed="rId4" cstate="screen">
               <a:extLst>
                 <a:ext uri="{28A0092B-C50C-407E-A947-70E740481C1C}">
                   <a14:useLocalDpi xmlns:a14="http://schemas.microsoft.com/office/drawing/2010/main"/>
@@ -11507,7 +11517,7 @@
           <p:nvPr/>
         </p:nvPicPr>
         <p:blipFill>
-          <a:blip r:embed="rId4">
+          <a:blip r:embed="rId5">
             <a:extLst>
               <a:ext uri="{28A0092B-C50C-407E-A947-70E740481C1C}">
                 <a14:useLocalDpi xmlns:a14="http://schemas.microsoft.com/office/drawing/2010/main"/>
@@ -11554,7 +11564,7 @@
           <p:nvPr/>
         </p:nvPicPr>
         <p:blipFill>
-          <a:blip r:embed="rId5" cstate="print">
+          <a:blip r:embed="rId6" cstate="print">
             <a:extLst>
               <a:ext uri="{28A0092B-C50C-407E-A947-70E740481C1C}">
                 <a14:useLocalDpi xmlns:a14="http://schemas.microsoft.com/office/drawing/2010/main" val="0"/>

</xml_diff>